<commit_message>
after lecture 3, 25 Dec
</commit_message>
<xml_diff>
--- a/3_Function_Class_and_Tools/ppt/Week_3_Function_and_Regex.pptx
+++ b/3_Function_Class_and_Tools/ppt/Week_3_Function_and_Regex.pptx
@@ -218,7 +218,7 @@
           <a:p>
             <a:fld id="{1B8DBD33-D643-454B-AB71-19E1BB871B35}" type="datetimeFigureOut">
               <a:rPr lang="en-US" smtClean="0"/>
-              <a:t>12/4/2021</a:t>
+              <a:t>12/25/2021</a:t>
             </a:fld>
             <a:endParaRPr lang="en-US"/>
           </a:p>
@@ -1217,7 +1217,7 @@
           <a:p>
             <a:fld id="{F6CB6433-3578-4F9F-A6A3-B53226434F34}" type="datetime1">
               <a:rPr lang="en-US" smtClean="0"/>
-              <a:t>12/4/2021</a:t>
+              <a:t>12/25/2021</a:t>
             </a:fld>
             <a:endParaRPr lang="en-US"/>
           </a:p>
@@ -1505,7 +1505,7 @@
           <a:p>
             <a:fld id="{4CD33F8F-DD6E-41B4-8DD0-46742E2AA233}" type="datetime1">
               <a:rPr lang="en-US" smtClean="0"/>
-              <a:t>12/4/2021</a:t>
+              <a:t>12/25/2021</a:t>
             </a:fld>
             <a:endParaRPr lang="en-US"/>
           </a:p>
@@ -1739,7 +1739,7 @@
           <a:p>
             <a:fld id="{72160383-289C-4AED-A8FB-5C333DAE7F71}" type="datetime1">
               <a:rPr lang="en-US" smtClean="0"/>
-              <a:t>12/4/2021</a:t>
+              <a:t>12/25/2021</a:t>
             </a:fld>
             <a:endParaRPr lang="en-US"/>
           </a:p>
@@ -1983,7 +1983,7 @@
           <a:p>
             <a:fld id="{A7062E2F-C4B1-4D6E-BB2B-041CEC62B65D}" type="datetime1">
               <a:rPr lang="en-US" smtClean="0"/>
-              <a:t>12/4/2021</a:t>
+              <a:t>12/25/2021</a:t>
             </a:fld>
             <a:endParaRPr lang="en-US"/>
           </a:p>
@@ -2247,7 +2247,7 @@
           <a:p>
             <a:fld id="{D1C52E92-BA47-4B7B-AEEA-CD2D372EC590}" type="datetime1">
               <a:rPr lang="en-US" smtClean="0"/>
-              <a:t>12/4/2021</a:t>
+              <a:t>12/25/2021</a:t>
             </a:fld>
             <a:endParaRPr lang="en-US"/>
           </a:p>
@@ -2526,7 +2526,7 @@
           <a:p>
             <a:fld id="{BDAA2E22-252C-44E0-A30E-F719BDAAF898}" type="datetime1">
               <a:rPr lang="en-US" smtClean="0"/>
-              <a:t>12/4/2021</a:t>
+              <a:t>12/25/2021</a:t>
             </a:fld>
             <a:endParaRPr lang="en-US"/>
           </a:p>
@@ -2909,7 +2909,7 @@
           <a:p>
             <a:fld id="{F6CB6433-3578-4F9F-A6A3-B53226434F34}" type="datetime1">
               <a:rPr lang="en-US" smtClean="0"/>
-              <a:t>12/4/2021</a:t>
+              <a:t>12/25/2021</a:t>
             </a:fld>
             <a:endParaRPr lang="en-US"/>
           </a:p>
@@ -3279,7 +3279,7 @@
           <a:p>
             <a:fld id="{AC6AD6BF-7972-4A8C-A121-6D72F8C64AED}" type="datetime1">
               <a:rPr lang="en-US" smtClean="0"/>
-              <a:t>12/4/2021</a:t>
+              <a:t>12/25/2021</a:t>
             </a:fld>
             <a:endParaRPr lang="en-US" dirty="0"/>
           </a:p>
@@ -3727,7 +3727,7 @@
           <a:p>
             <a:fld id="{1BF756EF-27F7-47E5-905B-C9347CB8E61F}" type="datetime1">
               <a:rPr lang="en-US" smtClean="0"/>
-              <a:t>12/4/2021</a:t>
+              <a:t>12/25/2021</a:t>
             </a:fld>
             <a:endParaRPr lang="en-US"/>
           </a:p>
@@ -3904,7 +3904,7 @@
           <a:p>
             <a:fld id="{9D11224D-3FE3-44D6-8689-EAC6A932042D}" type="datetime1">
               <a:rPr lang="en-US" smtClean="0"/>
-              <a:t>12/4/2021</a:t>
+              <a:t>12/25/2021</a:t>
             </a:fld>
             <a:endParaRPr lang="en-US"/>
           </a:p>
@@ -4053,7 +4053,7 @@
           <a:p>
             <a:fld id="{FE54684B-19A5-4C3A-8AE4-D06C17B4FD42}" type="datetime1">
               <a:rPr lang="en-US" smtClean="0"/>
-              <a:t>12/4/2021</a:t>
+              <a:t>12/25/2021</a:t>
             </a:fld>
             <a:endParaRPr lang="en-US"/>
           </a:p>
@@ -4400,7 +4400,7 @@
           <a:p>
             <a:fld id="{A4B0504A-64EA-4122-B9B1-8B5EFEA4DB98}" type="datetime1">
               <a:rPr lang="en-US" smtClean="0"/>
-              <a:t>12/4/2021</a:t>
+              <a:t>12/25/2021</a:t>
             </a:fld>
             <a:endParaRPr lang="en-US"/>
           </a:p>
@@ -4680,7 +4680,7 @@
           <a:p>
             <a:fld id="{83537B68-2185-4EBD-9001-675BD7788C66}" type="datetime1">
               <a:rPr lang="en-US" smtClean="0"/>
-              <a:t>12/4/2021</a:t>
+              <a:t>12/25/2021</a:t>
             </a:fld>
             <a:endParaRPr lang="en-US"/>
           </a:p>
@@ -6683,7 +6683,15 @@
             </a:r>
             <a:r>
               <a:rPr lang="mn-MN" dirty="0"/>
-              <a:t> байгуулж ажиллуулж үзүүл</a:t>
+              <a:t> байгуулж</a:t>
+            </a:r>
+            <a:r>
+              <a:rPr lang="en-US" dirty="0"/>
+              <a:t>,</a:t>
+            </a:r>
+            <a:r>
+              <a:rPr lang="mn-MN" dirty="0"/>
+              <a:t> ажиллуулж үзүүл</a:t>
             </a:r>
             <a:r>
               <a:rPr lang="en-US" dirty="0"/>
@@ -7001,9 +7009,10 @@
               <a:t>numpy</a:t>
             </a:r>
             <a:r>
-              <a:rPr lang="en-US" dirty="0"/>
-              <a:t>. </a:t>
-            </a:r>
+              <a:rPr lang="en-US" b="1" dirty="0"/>
+              <a:t> and create an array with only the negative even numbers.</a:t>
+            </a:r>
+            <a:endParaRPr lang="en-US" dirty="0"/>
           </a:p>
           <a:p>
             <a:r>
@@ -7014,13 +7023,7 @@
           <a:p>
             <a:r>
               <a:rPr lang="en-US" dirty="0"/>
-              <a:t>… and create an array with only the negative even numbers. … </a:t>
-            </a:r>
-          </a:p>
-          <a:p>
-            <a:r>
-              <a:rPr lang="en-US" dirty="0"/>
-              <a:t>… when odd, then raise “odd error” and continue to next loop, </a:t>
+              <a:t>… when negative &amp; odd, then raise “odd error” and continue to next loop, </a:t>
             </a:r>
           </a:p>
           <a:p>
@@ -7032,7 +7035,7 @@
           <a:p>
             <a:r>
               <a:rPr lang="en-US" dirty="0"/>
-              <a:t> </a:t>
+              <a:t>… </a:t>
             </a:r>
             <a:r>
               <a:rPr lang="en-US" b="1" dirty="0"/>
@@ -7604,7 +7607,7 @@
             </a:r>
             <a:r>
               <a:rPr lang="en-US" dirty="0"/>
-              <a:t>d, \D, \w, \W</a:t>
+              <a:t>d, \D, \w, \W, \s</a:t>
             </a:r>
           </a:p>
           <a:p>
@@ -9060,7 +9063,7 @@
           <a:p>
             <a:r>
               <a:rPr lang="en-US" dirty="0"/>
-              <a:t>Object</a:t>
+              <a:t>Object (instance)</a:t>
             </a:r>
           </a:p>
           <a:p>

</xml_diff>